<commit_message>
Add D3.js example (#2)
* Add d3

* Add d3
</commit_message>
<xml_diff>
--- a/Embrace the Graph Database.pptx
+++ b/Embrace the Graph Database.pptx
@@ -275,7 +275,7 @@
           <a:p>
             <a:fld id="{5281E343-34C4-3E47-B423-F0DB520B7DF5}" type="datetimeFigureOut">
               <a:rPr lang="en-US" smtClean="0"/>
-              <a:t>4/23/19</a:t>
+              <a:t>4/24/19</a:t>
             </a:fld>
             <a:endParaRPr lang="en-US"/>
           </a:p>
@@ -440,7 +440,7 @@
           <a:p>
             <a:fld id="{4AFEB15A-4DDC-D641-947F-5F403240A7D1}" type="datetimeFigureOut">
               <a:rPr lang="en-US" smtClean="0"/>
-              <a:t>4/23/19</a:t>
+              <a:t>4/24/19</a:t>
             </a:fld>
             <a:endParaRPr lang="en-US"/>
           </a:p>
@@ -9905,7 +9905,7 @@
             <a:fld id="{8FE24E97-B007-134C-8D18-DAE05A94524C}" type="datetimeFigureOut">
               <a:rPr lang="en-US" smtClean="0"/>
               <a:pPr/>
-              <a:t>4/23/19</a:t>
+              <a:t>4/24/19</a:t>
             </a:fld>
             <a:endParaRPr lang="en-US" dirty="0"/>
           </a:p>
@@ -11644,8 +11644,13 @@
           <a:p>
             <a:r>
               <a:rPr lang="en-US" dirty="0"/>
-              <a:t>Graph visualization</a:t>
-            </a:r>
+              <a:t>Graph visualization with D3.js and El </a:t>
+            </a:r>
+            <a:r>
+              <a:rPr lang="en-US" dirty="0" err="1"/>
+              <a:t>Grapho</a:t>
+            </a:r>
+            <a:endParaRPr lang="en-US" dirty="0"/>
           </a:p>
           <a:p>
             <a:endParaRPr lang="en-US" dirty="0"/>
@@ -13841,13 +13846,13 @@
           <a:p>
             <a:r>
               <a:rPr lang="en-US" dirty="0"/>
-              <a:t>Most popular likely d3.js</a:t>
-            </a:r>
-          </a:p>
-          <a:p>
-            <a:r>
-              <a:rPr lang="en-US" dirty="0"/>
-              <a:t>We utilize El </a:t>
+              <a:t>D3.js is flexible and popular</a:t>
+            </a:r>
+          </a:p>
+          <a:p>
+            <a:r>
+              <a:rPr lang="en-US" dirty="0"/>
+              <a:t>El </a:t>
             </a:r>
             <a:r>
               <a:rPr lang="en-US" dirty="0" err="1"/>
@@ -13855,7 +13860,7 @@
             </a:r>
             <a:r>
               <a:rPr lang="en-US" dirty="0"/>
-              <a:t> for simplicity</a:t>
+              <a:t> is performant and very simple</a:t>
             </a:r>
           </a:p>
           <a:p>
@@ -15045,8 +15050,13 @@
           <a:p>
             <a:r>
               <a:rPr lang="en-US" dirty="0"/>
-              <a:t>D3.js</a:t>
-            </a:r>
+              <a:t>D3.js / El </a:t>
+            </a:r>
+            <a:r>
+              <a:rPr lang="en-US" dirty="0" err="1"/>
+              <a:t>Grapho</a:t>
+            </a:r>
+            <a:endParaRPr lang="en-US" dirty="0"/>
           </a:p>
           <a:p>
             <a:r>

</xml_diff>

<commit_message>
remingtonc -> cisco-ie (#4)
</commit_message>
<xml_diff>
--- a/Embrace the Graph Database.pptx
+++ b/Embrace the Graph Database.pptx
@@ -14098,7 +14098,7 @@
               <a:rPr lang="en-US" sz="2400" u="sng" dirty="0">
                 <a:hlinkClick r:id="rId3"/>
               </a:rPr>
-              <a:t>https://github.com/remingtonc/embrace-graph-database</a:t>
+              <a:t>https://github.com/cisco-ie/embrace-graph-database</a:t>
             </a:r>
             <a:endParaRPr lang="en-US" sz="2400" u="sng" dirty="0"/>
           </a:p>
@@ -14117,7 +14117,7 @@
               <a:rPr lang="en-US" sz="2000" dirty="0">
                 <a:hlinkClick r:id="rId3"/>
               </a:rPr>
-              <a:t>https://github.com/remingtonc/embrace-graph-database</a:t>
+              <a:t>https://github.com/cisco-ie/embrace-graph-database</a:t>
             </a:r>
             <a:endParaRPr lang="en-US" sz="2000" dirty="0"/>
           </a:p>
@@ -14132,7 +14132,7 @@
               <a:rPr lang="en-US" sz="2000" dirty="0">
                 <a:hlinkClick r:id="rId4"/>
               </a:rPr>
-              <a:t>https://github.com/remingtonc/embrace-graph-database/archive/master.zip</a:t>
+              <a:t>https://github.com/cisco-ie/embrace-graph-database/archive/master.zip</a:t>
             </a:r>
             <a:endParaRPr lang="en-US" sz="2000" dirty="0"/>
           </a:p>
@@ -14261,7 +14261,7 @@
                 </a:solidFill>
                 <a:latin typeface="Menlo" panose="020B0609030804020204" pitchFamily="49" charset="0"/>
               </a:rPr>
-              <a:t>/</a:t>
+              <a:t>/cisco-</a:t>
             </a:r>
             <a:r>
               <a:rPr lang="en-US" dirty="0" err="1">
@@ -14270,7 +14270,7 @@
                 </a:solidFill>
                 <a:latin typeface="Menlo" panose="020B0609030804020204" pitchFamily="49" charset="0"/>
               </a:rPr>
-              <a:t>remingtonc</a:t>
+              <a:t>ie</a:t>
             </a:r>
             <a:r>
               <a:rPr lang="en-US" dirty="0">

</xml_diff>